<commit_message>
update full lab name
</commit_message>
<xml_diff>
--- a/SARA Slides Template.pptx
+++ b/SARA Slides Template.pptx
@@ -843,6 +843,59 @@
           </a:extLst>
         </p:spPr>
       </p:pic>
+      <p:sp>
+        <p:nvSpPr>
+          <p:cNvPr id="5" name="TextBox 4">
+            <a:extLst>
+              <a:ext uri="{FF2B5EF4-FFF2-40B4-BE49-F238E27FC236}">
+                <a16:creationId xmlns:a16="http://schemas.microsoft.com/office/drawing/2014/main" id="{6B02006E-61E5-E898-33C8-3D315EA27072}"/>
+              </a:ext>
+            </a:extLst>
+          </p:cNvPr>
+          <p:cNvSpPr txBox="1"/>
+          <p:nvPr userDrawn="1"/>
+        </p:nvSpPr>
+        <p:spPr>
+          <a:xfrm>
+            <a:off x="198330" y="75093"/>
+            <a:ext cx="3623378" cy="707886"/>
+          </a:xfrm>
+          <a:prstGeom prst="rect">
+            <a:avLst/>
+          </a:prstGeom>
+          <a:noFill/>
+        </p:spPr>
+        <p:txBody>
+          <a:bodyPr wrap="square" anchor="ctr">
+            <a:spAutoFit/>
+          </a:bodyPr>
+          <a:lstStyle/>
+          <a:p>
+            <a:r>
+              <a:rPr lang="en-US" sz="2000" b="1" dirty="0">
+                <a:solidFill>
+                  <a:srgbClr val="FFFFFF"/>
+                </a:solidFill>
+                <a:latin typeface="Californian FB" panose="020F0502020204030204" pitchFamily="34" charset="0"/>
+                <a:cs typeface="Californian FB" panose="020F0502020204030204" pitchFamily="34" charset="0"/>
+              </a:rPr>
+              <a:t>Surgical Artificial Intelligence </a:t>
+            </a:r>
+          </a:p>
+          <a:p>
+            <a:r>
+              <a:rPr lang="en-US" sz="2000" b="1" dirty="0">
+                <a:solidFill>
+                  <a:srgbClr val="FFFFFF"/>
+                </a:solidFill>
+                <a:latin typeface="Californian FB" panose="020F0502020204030204" pitchFamily="34" charset="0"/>
+                <a:cs typeface="Californian FB" panose="020F0502020204030204" pitchFamily="34" charset="0"/>
+              </a:rPr>
+              <a:t>Research Academy</a:t>
+            </a:r>
+          </a:p>
+        </p:txBody>
+      </p:sp>
     </p:spTree>
     <p:extLst>
       <p:ext uri="{BB962C8B-B14F-4D97-AF65-F5344CB8AC3E}">

</xml_diff>